<commit_message>
changes for demo testing done
</commit_message>
<xml_diff>
--- a/document.pptx
+++ b/document.pptx
@@ -5,7 +5,7 @@
     <p:sldMasterId id="2147483648" r:id="rId1"/>
   </p:sldMasterIdLst>
   <p:notesMasterIdLst>
-    <p:notesMasterId r:id="rId7"/>
+    <p:notesMasterId r:id="rId10"/>
   </p:notesMasterIdLst>
   <p:sldIdLst>
     <p:sldId id="256" r:id="rId2"/>
@@ -13,6 +13,9 @@
     <p:sldId id="258" r:id="rId4"/>
     <p:sldId id="259" r:id="rId5"/>
     <p:sldId id="260" r:id="rId6"/>
+    <p:sldId id="261" r:id="rId7"/>
+    <p:sldId id="262" r:id="rId8"/>
+    <p:sldId id="263" r:id="rId9"/>
   </p:sldIdLst>
   <p:sldSz cx="9144000" cy="6858000" type="screen4x3"/>
   <p:notesSz cx="6858000" cy="9144000"/>
@@ -877,6 +880,273 @@
             <a:fld id="{A33DE6EB-2202-4908-8E16-BA2A8346BC7B}" type="slidenum">
               <a:rPr lang="en-US" smtClean="0"/>
               <a:t>5</a:t>
+            </a:fld>
+            <a:endParaRPr lang="en-US"/>
+          </a:p>
+        </p:txBody>
+      </p:sp>
+    </p:spTree>
+  </p:cSld>
+  <p:clrMapOvr>
+    <a:masterClrMapping/>
+  </p:clrMapOvr>
+</p:notes>
+</file>
+
+<file path=ppt/notesSlides/notesSlide6.xml><?xml version="1.0" encoding="utf-8"?>
+<p:notes xmlns:a="http://schemas.openxmlformats.org/drawingml/2006/main" xmlns:r="http://schemas.openxmlformats.org/officeDocument/2006/relationships" xmlns:p="http://schemas.openxmlformats.org/presentationml/2006/main">
+  <p:cSld>
+    <p:spTree>
+      <p:nvGrpSpPr>
+        <p:cNvPr id="1" name=""/>
+        <p:cNvGrpSpPr/>
+        <p:nvPr/>
+      </p:nvGrpSpPr>
+      <p:grpSpPr>
+        <a:xfrm>
+          <a:off x="0" y="0"/>
+          <a:ext cx="0" cy="0"/>
+          <a:chOff x="0" y="0"/>
+          <a:chExt cx="0" cy="0"/>
+        </a:xfrm>
+      </p:grpSpPr>
+      <p:sp>
+        <p:nvSpPr>
+          <p:cNvPr id="2" name="Slide Image Placeholder 1"/>
+          <p:cNvSpPr>
+            <a:spLocks noGrp="1" noRot="1" noChangeAspect="1"/>
+          </p:cNvSpPr>
+          <p:nvPr>
+            <p:ph type="sldImg"/>
+          </p:nvPr>
+        </p:nvSpPr>
+        <p:spPr/>
+      </p:sp>
+      <p:sp>
+        <p:nvSpPr>
+          <p:cNvPr id="3" name="Notes Placeholder 2"/>
+          <p:cNvSpPr>
+            <a:spLocks noGrp="1"/>
+          </p:cNvSpPr>
+          <p:nvPr>
+            <p:ph type="body" idx="1"/>
+          </p:nvPr>
+        </p:nvSpPr>
+        <p:spPr/>
+        <p:txBody>
+          <a:bodyPr>
+            <a:normAutofit/>
+          </a:bodyPr>
+          <a:lstStyle/>
+          <a:p>
+            <a:r>
+              <a:rPr lang="en-US" dirty="0" smtClean="0"/>
+              <a:t>Prepare stage</a:t>
+            </a:r>
+            <a:r>
+              <a:rPr lang="en-US" baseline="0" dirty="0" smtClean="0"/>
+              <a:t> for release</a:t>
+            </a:r>
+            <a:endParaRPr lang="en-US" dirty="0"/>
+          </a:p>
+        </p:txBody>
+      </p:sp>
+      <p:sp>
+        <p:nvSpPr>
+          <p:cNvPr id="4" name="Slide Number Placeholder 3"/>
+          <p:cNvSpPr>
+            <a:spLocks noGrp="1"/>
+          </p:cNvSpPr>
+          <p:nvPr>
+            <p:ph type="sldNum" sz="quarter" idx="10"/>
+          </p:nvPr>
+        </p:nvSpPr>
+        <p:spPr/>
+        <p:txBody>
+          <a:bodyPr/>
+          <a:lstStyle/>
+          <a:p>
+            <a:fld id="{A33DE6EB-2202-4908-8E16-BA2A8346BC7B}" type="slidenum">
+              <a:rPr lang="en-US" smtClean="0"/>
+              <a:t>6</a:t>
+            </a:fld>
+            <a:endParaRPr lang="en-US"/>
+          </a:p>
+        </p:txBody>
+      </p:sp>
+    </p:spTree>
+  </p:cSld>
+  <p:clrMapOvr>
+    <a:masterClrMapping/>
+  </p:clrMapOvr>
+</p:notes>
+</file>
+
+<file path=ppt/notesSlides/notesSlide7.xml><?xml version="1.0" encoding="utf-8"?>
+<p:notes xmlns:a="http://schemas.openxmlformats.org/drawingml/2006/main" xmlns:r="http://schemas.openxmlformats.org/officeDocument/2006/relationships" xmlns:p="http://schemas.openxmlformats.org/presentationml/2006/main">
+  <p:cSld>
+    <p:spTree>
+      <p:nvGrpSpPr>
+        <p:cNvPr id="1" name=""/>
+        <p:cNvGrpSpPr/>
+        <p:nvPr/>
+      </p:nvGrpSpPr>
+      <p:grpSpPr>
+        <a:xfrm>
+          <a:off x="0" y="0"/>
+          <a:ext cx="0" cy="0"/>
+          <a:chOff x="0" y="0"/>
+          <a:chExt cx="0" cy="0"/>
+        </a:xfrm>
+      </p:grpSpPr>
+      <p:sp>
+        <p:nvSpPr>
+          <p:cNvPr id="2" name="Slide Image Placeholder 1"/>
+          <p:cNvSpPr>
+            <a:spLocks noGrp="1" noRot="1" noChangeAspect="1"/>
+          </p:cNvSpPr>
+          <p:nvPr>
+            <p:ph type="sldImg"/>
+          </p:nvPr>
+        </p:nvSpPr>
+        <p:spPr/>
+      </p:sp>
+      <p:sp>
+        <p:nvSpPr>
+          <p:cNvPr id="3" name="Notes Placeholder 2"/>
+          <p:cNvSpPr>
+            <a:spLocks noGrp="1"/>
+          </p:cNvSpPr>
+          <p:nvPr>
+            <p:ph type="body" idx="1"/>
+          </p:nvPr>
+        </p:nvSpPr>
+        <p:spPr/>
+        <p:txBody>
+          <a:bodyPr>
+            <a:normAutofit/>
+          </a:bodyPr>
+          <a:lstStyle/>
+          <a:p>
+            <a:r>
+              <a:rPr lang="en-US" dirty="0" smtClean="0"/>
+              <a:t>Make Panda3d model for a </a:t>
+            </a:r>
+            <a:r>
+              <a:rPr lang="en-US" dirty="0" err="1" smtClean="0"/>
+              <a:t>framset</a:t>
+            </a:r>
+            <a:r>
+              <a:rPr lang="en-US" baseline="0" dirty="0" smtClean="0"/>
+              <a:t> or image</a:t>
+            </a:r>
+            <a:endParaRPr lang="en-US" dirty="0"/>
+          </a:p>
+        </p:txBody>
+      </p:sp>
+      <p:sp>
+        <p:nvSpPr>
+          <p:cNvPr id="4" name="Slide Number Placeholder 3"/>
+          <p:cNvSpPr>
+            <a:spLocks noGrp="1"/>
+          </p:cNvSpPr>
+          <p:nvPr>
+            <p:ph type="sldNum" sz="quarter" idx="10"/>
+          </p:nvPr>
+        </p:nvSpPr>
+        <p:spPr/>
+        <p:txBody>
+          <a:bodyPr/>
+          <a:lstStyle/>
+          <a:p>
+            <a:fld id="{A33DE6EB-2202-4908-8E16-BA2A8346BC7B}" type="slidenum">
+              <a:rPr lang="en-US" smtClean="0"/>
+              <a:t>7</a:t>
+            </a:fld>
+            <a:endParaRPr lang="en-US"/>
+          </a:p>
+        </p:txBody>
+      </p:sp>
+    </p:spTree>
+  </p:cSld>
+  <p:clrMapOvr>
+    <a:masterClrMapping/>
+  </p:clrMapOvr>
+</p:notes>
+</file>
+
+<file path=ppt/notesSlides/notesSlide8.xml><?xml version="1.0" encoding="utf-8"?>
+<p:notes xmlns:a="http://schemas.openxmlformats.org/drawingml/2006/main" xmlns:r="http://schemas.openxmlformats.org/officeDocument/2006/relationships" xmlns:p="http://schemas.openxmlformats.org/presentationml/2006/main">
+  <p:cSld>
+    <p:spTree>
+      <p:nvGrpSpPr>
+        <p:cNvPr id="1" name=""/>
+        <p:cNvGrpSpPr/>
+        <p:nvPr/>
+      </p:nvGrpSpPr>
+      <p:grpSpPr>
+        <a:xfrm>
+          <a:off x="0" y="0"/>
+          <a:ext cx="0" cy="0"/>
+          <a:chOff x="0" y="0"/>
+          <a:chExt cx="0" cy="0"/>
+        </a:xfrm>
+      </p:grpSpPr>
+      <p:sp>
+        <p:nvSpPr>
+          <p:cNvPr id="2" name="Slide Image Placeholder 1"/>
+          <p:cNvSpPr>
+            <a:spLocks noGrp="1" noRot="1" noChangeAspect="1"/>
+          </p:cNvSpPr>
+          <p:nvPr>
+            <p:ph type="sldImg"/>
+          </p:nvPr>
+        </p:nvSpPr>
+        <p:spPr/>
+      </p:sp>
+      <p:sp>
+        <p:nvSpPr>
+          <p:cNvPr id="3" name="Notes Placeholder 2"/>
+          <p:cNvSpPr>
+            <a:spLocks noGrp="1"/>
+          </p:cNvSpPr>
+          <p:nvPr>
+            <p:ph type="body" idx="1"/>
+          </p:nvPr>
+        </p:nvSpPr>
+        <p:spPr/>
+        <p:txBody>
+          <a:bodyPr>
+            <a:normAutofit/>
+          </a:bodyPr>
+          <a:lstStyle/>
+          <a:p>
+            <a:r>
+              <a:rPr lang="en-US" dirty="0" smtClean="0"/>
+              <a:t>Transparent movie from Rush frames</a:t>
+            </a:r>
+            <a:endParaRPr lang="en-US" dirty="0"/>
+          </a:p>
+        </p:txBody>
+      </p:sp>
+      <p:sp>
+        <p:nvSpPr>
+          <p:cNvPr id="4" name="Slide Number Placeholder 3"/>
+          <p:cNvSpPr>
+            <a:spLocks noGrp="1"/>
+          </p:cNvSpPr>
+          <p:nvPr>
+            <p:ph type="sldNum" sz="quarter" idx="10"/>
+          </p:nvPr>
+        </p:nvSpPr>
+        <p:spPr/>
+        <p:txBody>
+          <a:bodyPr/>
+          <a:lstStyle/>
+          <a:p>
+            <a:fld id="{A33DE6EB-2202-4908-8E16-BA2A8346BC7B}" type="slidenum">
+              <a:rPr lang="en-US" smtClean="0"/>
+              <a:t>8</a:t>
             </a:fld>
             <a:endParaRPr lang="en-US"/>
           </a:p>
@@ -5875,6 +6145,1054 @@
                 <a:srgbClr val="002060"/>
               </a:solidFill>
             </a:endParaRPr>
+          </a:p>
+        </p:txBody>
+      </p:sp>
+    </p:spTree>
+  </p:cSld>
+  <p:clrMapOvr>
+    <a:masterClrMapping/>
+  </p:clrMapOvr>
+</p:sld>
+</file>
+
+<file path=ppt/slides/slide6.xml><?xml version="1.0" encoding="utf-8"?>
+<p:sld xmlns:a="http://schemas.openxmlformats.org/drawingml/2006/main" xmlns:r="http://schemas.openxmlformats.org/officeDocument/2006/relationships" xmlns:p="http://schemas.openxmlformats.org/presentationml/2006/main">
+  <p:cSld>
+    <p:spTree>
+      <p:nvGrpSpPr>
+        <p:cNvPr id="1" name=""/>
+        <p:cNvGrpSpPr/>
+        <p:nvPr/>
+      </p:nvGrpSpPr>
+      <p:grpSpPr>
+        <a:xfrm>
+          <a:off x="0" y="0"/>
+          <a:ext cx="0" cy="0"/>
+          <a:chOff x="0" y="0"/>
+          <a:chExt cx="0" cy="0"/>
+        </a:xfrm>
+      </p:grpSpPr>
+      <p:grpSp>
+        <p:nvGrpSpPr>
+          <p:cNvPr id="8" name="Group 7"/>
+          <p:cNvGrpSpPr/>
+          <p:nvPr/>
+        </p:nvGrpSpPr>
+        <p:grpSpPr>
+          <a:xfrm>
+            <a:off x="1066800" y="457200"/>
+            <a:ext cx="6324600" cy="6324600"/>
+            <a:chOff x="1066800" y="457200"/>
+            <a:chExt cx="6324600" cy="6324600"/>
+          </a:xfrm>
+        </p:grpSpPr>
+        <p:sp>
+          <p:nvSpPr>
+            <p:cNvPr id="5" name="Rectangle 4"/>
+            <p:cNvSpPr>
+              <a:spLocks noChangeAspect="1"/>
+            </p:cNvSpPr>
+            <p:nvPr/>
+          </p:nvSpPr>
+          <p:spPr>
+            <a:xfrm>
+              <a:off x="1066800" y="457200"/>
+              <a:ext cx="6324600" cy="6324600"/>
+            </a:xfrm>
+            <a:prstGeom prst="rect">
+              <a:avLst/>
+            </a:prstGeom>
+            <a:solidFill>
+              <a:schemeClr val="bg1">
+                <a:lumMod val="65000"/>
+              </a:schemeClr>
+            </a:solidFill>
+            <a:ln>
+              <a:solidFill>
+                <a:schemeClr val="tx1"/>
+              </a:solidFill>
+            </a:ln>
+          </p:spPr>
+          <p:style>
+            <a:lnRef idx="2">
+              <a:schemeClr val="accent1">
+                <a:shade val="50000"/>
+              </a:schemeClr>
+            </a:lnRef>
+            <a:fillRef idx="1">
+              <a:schemeClr val="accent1"/>
+            </a:fillRef>
+            <a:effectRef idx="0">
+              <a:schemeClr val="accent1"/>
+            </a:effectRef>
+            <a:fontRef idx="minor">
+              <a:schemeClr val="lt1"/>
+            </a:fontRef>
+          </p:style>
+          <p:txBody>
+            <a:bodyPr rtlCol="0" anchor="t"/>
+            <a:lstStyle/>
+            <a:p>
+              <a:pPr algn="just"/>
+              <a:r>
+                <a:rPr lang="en-US" sz="2000" b="1" dirty="0" smtClean="0"/>
+                <a:t>Parameters</a:t>
+              </a:r>
+              <a:r>
+                <a:rPr lang="en-US" sz="2000" dirty="0" smtClean="0"/>
+                <a:t>:</a:t>
+              </a:r>
+            </a:p>
+            <a:p>
+              <a:pPr marL="342900" indent="-342900" algn="just">
+                <a:buFont typeface="+mj-lt"/>
+                <a:buAutoNum type="arabicPeriod"/>
+              </a:pPr>
+              <a:r>
+                <a:rPr lang="en-US" sz="1600" b="1" dirty="0" smtClean="0">
+                  <a:solidFill>
+                    <a:srgbClr val="002060"/>
+                  </a:solidFill>
+                </a:rPr>
+                <a:t>Stage folder names: </a:t>
+              </a:r>
+              <a:r>
+                <a:rPr lang="en-US" sz="1600" dirty="0" smtClean="0">
+                  <a:solidFill>
+                    <a:srgbClr val="002060"/>
+                  </a:solidFill>
+                </a:rPr>
+                <a:t>Name of the folders from where to copy the frames for compiling the final movie. The conditions are:</a:t>
+              </a:r>
+            </a:p>
+            <a:p>
+              <a:pPr marL="800100" lvl="1" indent="-342900" algn="just">
+                <a:buFont typeface="+mj-lt"/>
+                <a:buAutoNum type="arabicPeriod"/>
+              </a:pPr>
+              <a:r>
+                <a:rPr lang="en-US" sz="1600" dirty="0" smtClean="0">
+                  <a:solidFill>
+                    <a:srgbClr val="002060"/>
+                  </a:solidFill>
+                </a:rPr>
+                <a:t>Folder name should be a valid folder</a:t>
+              </a:r>
+            </a:p>
+            <a:p>
+              <a:pPr marL="800100" lvl="1" indent="-342900" algn="just">
+                <a:buFont typeface="+mj-lt"/>
+                <a:buAutoNum type="arabicPeriod"/>
+              </a:pPr>
+              <a:r>
+                <a:rPr lang="en-US" sz="1600" dirty="0" smtClean="0">
+                  <a:solidFill>
+                    <a:srgbClr val="002060"/>
+                  </a:solidFill>
+                </a:rPr>
+                <a:t>It must contain images in name format frame__??????.</a:t>
+              </a:r>
+              <a:r>
+                <a:rPr lang="en-US" sz="1600" dirty="0" err="1" smtClean="0">
+                  <a:solidFill>
+                    <a:srgbClr val="002060"/>
+                  </a:solidFill>
+                </a:rPr>
+                <a:t>png</a:t>
+              </a:r>
+              <a:endParaRPr lang="en-US" sz="1600" dirty="0" smtClean="0">
+                <a:solidFill>
+                  <a:srgbClr val="002060"/>
+                </a:solidFill>
+              </a:endParaRPr>
+            </a:p>
+            <a:p>
+              <a:pPr marL="800100" lvl="1" indent="-342900" algn="just">
+                <a:buFont typeface="+mj-lt"/>
+                <a:buAutoNum type="arabicPeriod"/>
+              </a:pPr>
+              <a:r>
+                <a:rPr lang="en-US" sz="1600" dirty="0" smtClean="0">
+                  <a:solidFill>
+                    <a:srgbClr val="002060"/>
+                  </a:solidFill>
+                </a:rPr>
+                <a:t>The frames will be copied under the sequence of name of folders entered</a:t>
+              </a:r>
+            </a:p>
+            <a:p>
+              <a:pPr marL="342900" indent="-342900" algn="just">
+                <a:buFont typeface="+mj-lt"/>
+                <a:buAutoNum type="arabicPeriod"/>
+              </a:pPr>
+              <a:r>
+                <a:rPr lang="en-US" sz="1600" b="1" dirty="0" smtClean="0">
+                  <a:solidFill>
+                    <a:srgbClr val="002060"/>
+                  </a:solidFill>
+                </a:rPr>
+                <a:t>Output stage name: </a:t>
+              </a:r>
+              <a:r>
+                <a:rPr lang="en-US" sz="1600" dirty="0" smtClean="0">
+                  <a:solidFill>
+                    <a:srgbClr val="002060"/>
+                  </a:solidFill>
+                </a:rPr>
+                <a:t>This is the name of the stage and the name of the movie also.</a:t>
+              </a:r>
+            </a:p>
+            <a:p>
+              <a:pPr marL="342900" indent="-342900" algn="just">
+                <a:buFont typeface="+mj-lt"/>
+                <a:buAutoNum type="arabicPeriod"/>
+              </a:pPr>
+              <a:r>
+                <a:rPr lang="en-US" sz="1600" b="1" dirty="0" smtClean="0">
+                  <a:solidFill>
+                    <a:srgbClr val="002060"/>
+                  </a:solidFill>
+                </a:rPr>
+                <a:t>Movie format: </a:t>
+              </a:r>
+              <a:r>
+                <a:rPr lang="en-US" sz="1600" dirty="0" smtClean="0">
+                  <a:solidFill>
+                    <a:srgbClr val="002060"/>
+                  </a:solidFill>
+                </a:rPr>
+                <a:t>Default is gif.</a:t>
+              </a:r>
+              <a:endParaRPr lang="en-US" sz="1600" dirty="0">
+                <a:solidFill>
+                  <a:srgbClr val="002060"/>
+                </a:solidFill>
+              </a:endParaRPr>
+            </a:p>
+            <a:p>
+              <a:pPr marL="342900" indent="-342900" algn="just">
+                <a:buFont typeface="+mj-lt"/>
+                <a:buAutoNum type="arabicPeriod"/>
+              </a:pPr>
+              <a:endParaRPr lang="en-US" sz="1600" dirty="0" smtClean="0">
+                <a:solidFill>
+                  <a:srgbClr val="002060"/>
+                </a:solidFill>
+              </a:endParaRPr>
+            </a:p>
+            <a:p>
+              <a:pPr marL="342900" indent="-342900" algn="just">
+                <a:buFont typeface="+mj-lt"/>
+                <a:buAutoNum type="arabicPeriod"/>
+              </a:pPr>
+              <a:endParaRPr lang="en-US" sz="1600" dirty="0">
+                <a:solidFill>
+                  <a:srgbClr val="002060"/>
+                </a:solidFill>
+              </a:endParaRPr>
+            </a:p>
+            <a:p>
+              <a:pPr marL="342900" indent="-342900" algn="just"/>
+              <a:r>
+                <a:rPr lang="en-US" sz="1600" dirty="0" smtClean="0">
+                  <a:solidFill>
+                    <a:srgbClr val="002060"/>
+                  </a:solidFill>
+                </a:rPr>
+                <a:t>The left example will create movie ibrt-1.mp4 in video folder from rushes directory. The right example will create stagefinal.mp4 from rushes in stage1 and stage2 directories.</a:t>
+              </a:r>
+            </a:p>
+            <a:p>
+              <a:pPr marL="342900" indent="-342900" algn="just"/>
+              <a:endParaRPr lang="en-US" sz="1600" dirty="0" smtClean="0">
+                <a:solidFill>
+                  <a:srgbClr val="002060"/>
+                </a:solidFill>
+              </a:endParaRPr>
+            </a:p>
+          </p:txBody>
+        </p:sp>
+        <p:pic>
+          <p:nvPicPr>
+            <p:cNvPr id="1026" name="Picture 2"/>
+            <p:cNvPicPr>
+              <a:picLocks noChangeAspect="1" noChangeArrowheads="1"/>
+            </p:cNvPicPr>
+            <p:nvPr/>
+          </p:nvPicPr>
+          <p:blipFill>
+            <a:blip r:embed="rId3" cstate="print"/>
+            <a:srcRect/>
+            <a:stretch>
+              <a:fillRect/>
+            </a:stretch>
+          </p:blipFill>
+          <p:spPr bwMode="auto">
+            <a:xfrm>
+              <a:off x="1219200" y="4343400"/>
+              <a:ext cx="2971800" cy="2228850"/>
+            </a:xfrm>
+            <a:prstGeom prst="rect">
+              <a:avLst/>
+            </a:prstGeom>
+            <a:noFill/>
+            <a:ln w="9525">
+              <a:noFill/>
+              <a:miter lim="800000"/>
+              <a:headEnd/>
+              <a:tailEnd/>
+            </a:ln>
+            <a:effectLst/>
+          </p:spPr>
+        </p:pic>
+        <p:pic>
+          <p:nvPicPr>
+            <p:cNvPr id="1027" name="Picture 3"/>
+            <p:cNvPicPr>
+              <a:picLocks noChangeAspect="1" noChangeArrowheads="1"/>
+            </p:cNvPicPr>
+            <p:nvPr/>
+          </p:nvPicPr>
+          <p:blipFill>
+            <a:blip r:embed="rId4" cstate="print"/>
+            <a:srcRect/>
+            <a:stretch>
+              <a:fillRect/>
+            </a:stretch>
+          </p:blipFill>
+          <p:spPr bwMode="auto">
+            <a:xfrm>
+              <a:off x="4343400" y="4343400"/>
+              <a:ext cx="2981325" cy="2190750"/>
+            </a:xfrm>
+            <a:prstGeom prst="rect">
+              <a:avLst/>
+            </a:prstGeom>
+            <a:noFill/>
+            <a:ln w="9525">
+              <a:noFill/>
+              <a:miter lim="800000"/>
+              <a:headEnd/>
+              <a:tailEnd/>
+            </a:ln>
+            <a:effectLst/>
+          </p:spPr>
+        </p:pic>
+      </p:grpSp>
+    </p:spTree>
+  </p:cSld>
+  <p:clrMapOvr>
+    <a:masterClrMapping/>
+  </p:clrMapOvr>
+</p:sld>
+</file>
+
+<file path=ppt/slides/slide7.xml><?xml version="1.0" encoding="utf-8"?>
+<p:sld xmlns:a="http://schemas.openxmlformats.org/drawingml/2006/main" xmlns:r="http://schemas.openxmlformats.org/officeDocument/2006/relationships" xmlns:p="http://schemas.openxmlformats.org/presentationml/2006/main">
+  <p:cSld>
+    <p:spTree>
+      <p:nvGrpSpPr>
+        <p:cNvPr id="1" name=""/>
+        <p:cNvGrpSpPr/>
+        <p:nvPr/>
+      </p:nvGrpSpPr>
+      <p:grpSpPr>
+        <a:xfrm>
+          <a:off x="0" y="0"/>
+          <a:ext cx="0" cy="0"/>
+          <a:chOff x="0" y="0"/>
+          <a:chExt cx="0" cy="0"/>
+        </a:xfrm>
+      </p:grpSpPr>
+      <p:sp>
+        <p:nvSpPr>
+          <p:cNvPr id="5" name="Rectangle 4"/>
+          <p:cNvSpPr>
+            <a:spLocks noChangeAspect="1"/>
+          </p:cNvSpPr>
+          <p:nvPr/>
+        </p:nvSpPr>
+        <p:spPr>
+          <a:xfrm>
+            <a:off x="1066800" y="457200"/>
+            <a:ext cx="6324600" cy="6324600"/>
+          </a:xfrm>
+          <a:prstGeom prst="rect">
+            <a:avLst/>
+          </a:prstGeom>
+          <a:solidFill>
+            <a:schemeClr val="bg1">
+              <a:lumMod val="65000"/>
+            </a:schemeClr>
+          </a:solidFill>
+          <a:ln>
+            <a:solidFill>
+              <a:schemeClr val="tx1"/>
+            </a:solidFill>
+          </a:ln>
+        </p:spPr>
+        <p:style>
+          <a:lnRef idx="2">
+            <a:schemeClr val="accent1">
+              <a:shade val="50000"/>
+            </a:schemeClr>
+          </a:lnRef>
+          <a:fillRef idx="1">
+            <a:schemeClr val="accent1"/>
+          </a:fillRef>
+          <a:effectRef idx="0">
+            <a:schemeClr val="accent1"/>
+          </a:effectRef>
+          <a:fontRef idx="minor">
+            <a:schemeClr val="lt1"/>
+          </a:fontRef>
+        </p:style>
+        <p:txBody>
+          <a:bodyPr rtlCol="0" anchor="t"/>
+          <a:lstStyle/>
+          <a:p>
+            <a:pPr algn="just"/>
+            <a:r>
+              <a:rPr lang="en-US" sz="2000" b="1" dirty="0" smtClean="0"/>
+              <a:t>Parameters</a:t>
+            </a:r>
+            <a:r>
+              <a:rPr lang="en-US" sz="2000" dirty="0" smtClean="0"/>
+              <a:t>:</a:t>
+            </a:r>
+          </a:p>
+          <a:p>
+            <a:pPr marL="342900" indent="-342900" algn="just">
+              <a:buFont typeface="+mj-lt"/>
+              <a:buAutoNum type="arabicPeriod"/>
+            </a:pPr>
+            <a:r>
+              <a:rPr lang="en-US" sz="1600" b="1" dirty="0" smtClean="0">
+                <a:solidFill>
+                  <a:srgbClr val="002060"/>
+                </a:solidFill>
+              </a:rPr>
+              <a:t>Stage file/ folder names: </a:t>
+            </a:r>
+            <a:r>
+              <a:rPr lang="en-US" sz="1600" dirty="0" smtClean="0">
+                <a:solidFill>
+                  <a:srgbClr val="002060"/>
+                </a:solidFill>
+              </a:rPr>
+              <a:t>Name of the image or movie file, or folder name of already extracted framesets.</a:t>
+            </a:r>
+          </a:p>
+          <a:p>
+            <a:pPr marL="342900" indent="-342900" algn="just">
+              <a:buFont typeface="+mj-lt"/>
+              <a:buAutoNum type="arabicPeriod"/>
+            </a:pPr>
+            <a:r>
+              <a:rPr lang="en-US" sz="1600" b="1" dirty="0" smtClean="0">
+                <a:solidFill>
+                  <a:srgbClr val="002060"/>
+                </a:solidFill>
+              </a:rPr>
+              <a:t>Output file name: </a:t>
+            </a:r>
+            <a:r>
+              <a:rPr lang="en-US" sz="1600" dirty="0" smtClean="0">
+                <a:solidFill>
+                  <a:srgbClr val="002060"/>
+                </a:solidFill>
+              </a:rPr>
+              <a:t>Here only the name of the file is to be provided, not the path or extension as by default all models are “.egg” in model directory.</a:t>
+            </a:r>
+          </a:p>
+          <a:p>
+            <a:pPr marL="342900" indent="-342900" algn="just">
+              <a:buFont typeface="+mj-lt"/>
+              <a:buAutoNum type="arabicPeriod"/>
+            </a:pPr>
+            <a:r>
+              <a:rPr lang="en-US" sz="1600" b="1" dirty="0" smtClean="0">
+                <a:solidFill>
+                  <a:srgbClr val="002060"/>
+                </a:solidFill>
+              </a:rPr>
+              <a:t>Frame Range: </a:t>
+            </a:r>
+            <a:r>
+              <a:rPr lang="en-US" sz="1600" dirty="0" smtClean="0">
+                <a:solidFill>
+                  <a:srgbClr val="002060"/>
+                </a:solidFill>
+              </a:rPr>
+              <a:t>In case of movie or folder name, kindly provide the starting and last frames to be included in the model</a:t>
+            </a:r>
+          </a:p>
+          <a:p>
+            <a:pPr marL="342900" indent="-342900" algn="just">
+              <a:buFont typeface="+mj-lt"/>
+              <a:buAutoNum type="arabicPeriod"/>
+            </a:pPr>
+            <a:r>
+              <a:rPr lang="en-US" sz="1600" b="1" dirty="0" smtClean="0">
+                <a:solidFill>
+                  <a:srgbClr val="002060"/>
+                </a:solidFill>
+              </a:rPr>
+              <a:t>FPS: </a:t>
+            </a:r>
+            <a:r>
+              <a:rPr lang="en-US" sz="1600" dirty="0" smtClean="0">
+                <a:solidFill>
+                  <a:srgbClr val="002060"/>
+                </a:solidFill>
+              </a:rPr>
+              <a:t>By default the FPS of the movie will be used, but for directory, or frameset, a FPS needs to be provided. If not, the active project default FPS will be considered. This is not needed for images.</a:t>
+            </a:r>
+            <a:endParaRPr lang="en-US" sz="1600" b="1" dirty="0" smtClean="0">
+              <a:solidFill>
+                <a:srgbClr val="002060"/>
+              </a:solidFill>
+            </a:endParaRPr>
+          </a:p>
+          <a:p>
+            <a:pPr marL="342900" indent="-342900" algn="just"/>
+            <a:endParaRPr lang="en-US" sz="1600" dirty="0" smtClean="0">
+              <a:solidFill>
+                <a:srgbClr val="002060"/>
+              </a:solidFill>
+            </a:endParaRPr>
+          </a:p>
+          <a:p>
+            <a:pPr marL="342900" indent="-342900" algn="just"/>
+            <a:endParaRPr lang="en-US" sz="1600" dirty="0" smtClean="0">
+              <a:solidFill>
+                <a:srgbClr val="002060"/>
+              </a:solidFill>
+            </a:endParaRPr>
+          </a:p>
+        </p:txBody>
+      </p:sp>
+      <p:pic>
+        <p:nvPicPr>
+          <p:cNvPr id="2050" name="Picture 2"/>
+          <p:cNvPicPr>
+            <a:picLocks noChangeAspect="1" noChangeArrowheads="1"/>
+          </p:cNvPicPr>
+          <p:nvPr/>
+        </p:nvPicPr>
+        <p:blipFill>
+          <a:blip r:embed="rId3" cstate="print"/>
+          <a:srcRect/>
+          <a:stretch>
+            <a:fillRect/>
+          </a:stretch>
+        </p:blipFill>
+        <p:spPr bwMode="auto">
+          <a:xfrm>
+            <a:off x="4343400" y="3657600"/>
+            <a:ext cx="2952750" cy="2790825"/>
+          </a:xfrm>
+          <a:prstGeom prst="rect">
+            <a:avLst/>
+          </a:prstGeom>
+          <a:noFill/>
+          <a:ln w="9525">
+            <a:noFill/>
+            <a:miter lim="800000"/>
+            <a:headEnd/>
+            <a:tailEnd/>
+          </a:ln>
+          <a:effectLst/>
+        </p:spPr>
+      </p:pic>
+      <p:sp>
+        <p:nvSpPr>
+          <p:cNvPr id="7" name="Rectangle 6"/>
+          <p:cNvSpPr/>
+          <p:nvPr/>
+        </p:nvSpPr>
+        <p:spPr>
+          <a:xfrm>
+            <a:off x="1295400" y="3429000"/>
+            <a:ext cx="2819400" cy="3124200"/>
+          </a:xfrm>
+          <a:prstGeom prst="rect">
+            <a:avLst/>
+          </a:prstGeom>
+          <a:noFill/>
+        </p:spPr>
+        <p:style>
+          <a:lnRef idx="2">
+            <a:schemeClr val="accent1">
+              <a:shade val="50000"/>
+            </a:schemeClr>
+          </a:lnRef>
+          <a:fillRef idx="1">
+            <a:schemeClr val="accent1"/>
+          </a:fillRef>
+          <a:effectRef idx="0">
+            <a:schemeClr val="accent1"/>
+          </a:effectRef>
+          <a:fontRef idx="minor">
+            <a:schemeClr val="lt1"/>
+          </a:fontRef>
+        </p:style>
+        <p:txBody>
+          <a:bodyPr rtlCol="0" anchor="ctr"/>
+          <a:lstStyle/>
+          <a:p>
+            <a:pPr algn="just"/>
+            <a:r>
+              <a:rPr lang="en-US" sz="1600" dirty="0" smtClean="0">
+                <a:solidFill>
+                  <a:srgbClr val="002060"/>
+                </a:solidFill>
+              </a:rPr>
+              <a:t>The example here will create a Panda3d model as:</a:t>
+            </a:r>
+          </a:p>
+          <a:p>
+            <a:pPr algn="just"/>
+            <a:endParaRPr lang="en-US" sz="1600" dirty="0" smtClean="0">
+              <a:solidFill>
+                <a:srgbClr val="002060"/>
+              </a:solidFill>
+            </a:endParaRPr>
+          </a:p>
+          <a:p>
+            <a:pPr algn="just"/>
+            <a:r>
+              <a:rPr lang="en-US" sz="1600" dirty="0" smtClean="0">
+                <a:solidFill>
+                  <a:srgbClr val="002060"/>
+                </a:solidFill>
+              </a:rPr>
+              <a:t>Name: dogs.egg</a:t>
+            </a:r>
+          </a:p>
+          <a:p>
+            <a:pPr algn="just"/>
+            <a:r>
+              <a:rPr lang="en-US" sz="1600" dirty="0" smtClean="0">
+                <a:solidFill>
+                  <a:srgbClr val="002060"/>
+                </a:solidFill>
+              </a:rPr>
+              <a:t>Frame numbers from 1 to 126</a:t>
+            </a:r>
+          </a:p>
+          <a:p>
+            <a:pPr algn="just"/>
+            <a:r>
+              <a:rPr lang="en-US" sz="1600" dirty="0" smtClean="0">
+                <a:solidFill>
+                  <a:srgbClr val="002060"/>
+                </a:solidFill>
+              </a:rPr>
+              <a:t>From movie Dogs.mp4</a:t>
+            </a:r>
+          </a:p>
+          <a:p>
+            <a:pPr algn="just"/>
+            <a:r>
+              <a:rPr lang="en-US" sz="1600" dirty="0" smtClean="0">
+                <a:solidFill>
+                  <a:srgbClr val="002060"/>
+                </a:solidFill>
+              </a:rPr>
+              <a:t>Audio will be saved in audio/Dogs.aac</a:t>
+            </a:r>
+          </a:p>
+          <a:p>
+            <a:pPr algn="just"/>
+            <a:r>
+              <a:rPr lang="en-US" sz="1600" dirty="0" smtClean="0">
+                <a:solidFill>
+                  <a:srgbClr val="002060"/>
+                </a:solidFill>
+              </a:rPr>
+              <a:t>FPS will be from video</a:t>
+            </a:r>
+          </a:p>
+          <a:p>
+            <a:pPr algn="just"/>
+            <a:endParaRPr lang="en-US" sz="1600" dirty="0"/>
+          </a:p>
+        </p:txBody>
+      </p:sp>
+    </p:spTree>
+  </p:cSld>
+  <p:clrMapOvr>
+    <a:masterClrMapping/>
+  </p:clrMapOvr>
+</p:sld>
+</file>
+
+<file path=ppt/slides/slide8.xml><?xml version="1.0" encoding="utf-8"?>
+<p:sld xmlns:a="http://schemas.openxmlformats.org/drawingml/2006/main" xmlns:r="http://schemas.openxmlformats.org/officeDocument/2006/relationships" xmlns:p="http://schemas.openxmlformats.org/presentationml/2006/main">
+  <p:cSld>
+    <p:spTree>
+      <p:nvGrpSpPr>
+        <p:cNvPr id="1" name=""/>
+        <p:cNvGrpSpPr/>
+        <p:nvPr/>
+      </p:nvGrpSpPr>
+      <p:grpSpPr>
+        <a:xfrm>
+          <a:off x="0" y="0"/>
+          <a:ext cx="0" cy="0"/>
+          <a:chOff x="0" y="0"/>
+          <a:chExt cx="0" cy="0"/>
+        </a:xfrm>
+      </p:grpSpPr>
+      <p:sp>
+        <p:nvSpPr>
+          <p:cNvPr id="6" name="Rectangle 5"/>
+          <p:cNvSpPr>
+            <a:spLocks noChangeAspect="1"/>
+          </p:cNvSpPr>
+          <p:nvPr/>
+        </p:nvSpPr>
+        <p:spPr>
+          <a:xfrm>
+            <a:off x="1066800" y="457200"/>
+            <a:ext cx="6324600" cy="6324600"/>
+          </a:xfrm>
+          <a:prstGeom prst="rect">
+            <a:avLst/>
+          </a:prstGeom>
+          <a:solidFill>
+            <a:schemeClr val="bg1">
+              <a:lumMod val="65000"/>
+            </a:schemeClr>
+          </a:solidFill>
+          <a:ln>
+            <a:solidFill>
+              <a:schemeClr val="tx1"/>
+            </a:solidFill>
+          </a:ln>
+        </p:spPr>
+        <p:style>
+          <a:lnRef idx="2">
+            <a:schemeClr val="accent1">
+              <a:shade val="50000"/>
+            </a:schemeClr>
+          </a:lnRef>
+          <a:fillRef idx="1">
+            <a:schemeClr val="accent1"/>
+          </a:fillRef>
+          <a:effectRef idx="0">
+            <a:schemeClr val="accent1"/>
+          </a:effectRef>
+          <a:fontRef idx="minor">
+            <a:schemeClr val="lt1"/>
+          </a:fontRef>
+        </p:style>
+        <p:txBody>
+          <a:bodyPr rtlCol="0" anchor="t"/>
+          <a:lstStyle/>
+          <a:p>
+            <a:pPr algn="just"/>
+            <a:r>
+              <a:rPr lang="en-US" sz="2000" b="1" dirty="0" smtClean="0"/>
+              <a:t>Parameters</a:t>
+            </a:r>
+            <a:r>
+              <a:rPr lang="en-US" sz="2000" dirty="0" smtClean="0"/>
+              <a:t>:</a:t>
+            </a:r>
+          </a:p>
+          <a:p>
+            <a:pPr marL="342900" indent="-342900" algn="just">
+              <a:buFont typeface="+mj-lt"/>
+              <a:buAutoNum type="arabicPeriod"/>
+            </a:pPr>
+            <a:r>
+              <a:rPr lang="en-US" sz="1600" b="1" dirty="0" smtClean="0">
+                <a:solidFill>
+                  <a:srgbClr val="002060"/>
+                </a:solidFill>
+              </a:rPr>
+              <a:t>Final Image Frame: </a:t>
+            </a:r>
+            <a:r>
+              <a:rPr lang="en-US" sz="1600" dirty="0" smtClean="0">
+                <a:solidFill>
+                  <a:srgbClr val="002060"/>
+                </a:solidFill>
+              </a:rPr>
+              <a:t>This is the frame which is the final outcome after the series of frames processed</a:t>
+            </a:r>
+          </a:p>
+          <a:p>
+            <a:pPr marL="342900" indent="-342900" algn="just">
+              <a:buFont typeface="+mj-lt"/>
+              <a:buAutoNum type="arabicPeriod"/>
+            </a:pPr>
+            <a:r>
+              <a:rPr lang="en-US" sz="1600" b="1" dirty="0" smtClean="0">
+                <a:solidFill>
+                  <a:srgbClr val="002060"/>
+                </a:solidFill>
+              </a:rPr>
+              <a:t>Output file name: </a:t>
+            </a:r>
+            <a:r>
+              <a:rPr lang="en-US" sz="1600" dirty="0" smtClean="0">
+                <a:solidFill>
+                  <a:srgbClr val="002060"/>
+                </a:solidFill>
+              </a:rPr>
+              <a:t>This is the name of the output directory produced</a:t>
+            </a:r>
+          </a:p>
+          <a:p>
+            <a:pPr marL="342900" indent="-342900" algn="just">
+              <a:buFont typeface="+mj-lt"/>
+              <a:buAutoNum type="arabicPeriod"/>
+            </a:pPr>
+            <a:r>
+              <a:rPr lang="en-US" sz="1600" b="1" dirty="0" smtClean="0">
+                <a:solidFill>
+                  <a:srgbClr val="002060"/>
+                </a:solidFill>
+              </a:rPr>
+              <a:t>Color of Pen: </a:t>
+            </a:r>
+            <a:r>
+              <a:rPr lang="en-US" sz="1600" dirty="0" smtClean="0">
+                <a:solidFill>
+                  <a:srgbClr val="002060"/>
+                </a:solidFill>
+              </a:rPr>
+              <a:t>This could be one of: White, Black, Red, Blue, Green &amp; Yellow. Special provision for Panda3d default back screen is panda3d which is Dim Gray</a:t>
+            </a:r>
+          </a:p>
+          <a:p>
+            <a:pPr marL="342900" indent="-342900" algn="just"/>
+            <a:endParaRPr lang="en-US" sz="1600" b="1" dirty="0" smtClean="0">
+              <a:solidFill>
+                <a:srgbClr val="002060"/>
+              </a:solidFill>
+            </a:endParaRPr>
+          </a:p>
+          <a:p>
+            <a:pPr marL="342900" indent="-342900" algn="just"/>
+            <a:r>
+              <a:rPr lang="en-US" sz="1600" b="1" dirty="0" smtClean="0">
+                <a:solidFill>
+                  <a:srgbClr val="002060"/>
+                </a:solidFill>
+              </a:rPr>
+              <a:t>Process steps for video creation:</a:t>
+            </a:r>
+          </a:p>
+          <a:p>
+            <a:pPr marL="342900" indent="-342900" algn="just">
+              <a:buAutoNum type="arabicPeriod"/>
+            </a:pPr>
+            <a:r>
+              <a:rPr lang="en-US" sz="1600" b="1" dirty="0" smtClean="0">
+                <a:solidFill>
+                  <a:srgbClr val="002060"/>
+                </a:solidFill>
+              </a:rPr>
+              <a:t>[OPTIONAL] Get the doodle coordinates and draw them</a:t>
+            </a:r>
+          </a:p>
+          <a:p>
+            <a:pPr marL="342900" indent="-342900" algn="just">
+              <a:buAutoNum type="arabicPeriod"/>
+            </a:pPr>
+            <a:r>
+              <a:rPr lang="en-US" sz="1600" b="1" dirty="0" smtClean="0">
+                <a:solidFill>
+                  <a:srgbClr val="002060"/>
+                </a:solidFill>
+              </a:rPr>
+              <a:t>[OPTIONAL] Create a animated model for doodle </a:t>
+            </a:r>
+            <a:r>
+              <a:rPr lang="en-US" sz="1600" b="1" dirty="0" err="1" smtClean="0">
+                <a:solidFill>
+                  <a:srgbClr val="002060"/>
+                </a:solidFill>
+              </a:rPr>
+              <a:t>drawup</a:t>
+            </a:r>
+            <a:endParaRPr lang="en-US" sz="1600" b="1" dirty="0" smtClean="0">
+              <a:solidFill>
+                <a:srgbClr val="002060"/>
+              </a:solidFill>
+            </a:endParaRPr>
+          </a:p>
+          <a:p>
+            <a:pPr marL="342900" indent="-342900" algn="just">
+              <a:buAutoNum type="arabicPeriod"/>
+            </a:pPr>
+            <a:r>
+              <a:rPr lang="en-US" sz="1600" b="1" dirty="0" smtClean="0">
+                <a:solidFill>
+                  <a:srgbClr val="002060"/>
+                </a:solidFill>
+              </a:rPr>
+              <a:t>[OPTIONAL] Load the doodle model like any other model with movie as JJRB</a:t>
+            </a:r>
+          </a:p>
+          <a:p>
+            <a:pPr marL="342900" indent="-342900" algn="just">
+              <a:buAutoNum type="arabicPeriod"/>
+            </a:pPr>
+            <a:r>
+              <a:rPr lang="en-US" sz="1600" b="1" dirty="0" smtClean="0">
+                <a:solidFill>
+                  <a:srgbClr val="002060"/>
+                </a:solidFill>
+              </a:rPr>
+              <a:t>Load the picture in Panda3d</a:t>
+            </a:r>
+          </a:p>
+          <a:p>
+            <a:pPr marL="342900" indent="-342900" algn="just">
+              <a:buAutoNum type="arabicPeriod"/>
+            </a:pPr>
+            <a:r>
+              <a:rPr lang="en-US" sz="1600" b="1" dirty="0" smtClean="0">
+                <a:solidFill>
+                  <a:srgbClr val="002060"/>
+                </a:solidFill>
+              </a:rPr>
+              <a:t>Next </a:t>
+            </a:r>
+            <a:r>
+              <a:rPr lang="en-US" sz="1600" b="1" smtClean="0">
+                <a:solidFill>
+                  <a:srgbClr val="002060"/>
+                </a:solidFill>
+              </a:rPr>
+              <a:t>we encompass </a:t>
+            </a:r>
+            <a:r>
+              <a:rPr lang="en-US" sz="1600" b="1" dirty="0" smtClean="0">
+                <a:solidFill>
+                  <a:srgbClr val="002060"/>
+                </a:solidFill>
+              </a:rPr>
+              <a:t>the picture with (default) black. The sequence of covering will be the sequence of drawing. Some methods are:</a:t>
+            </a:r>
+          </a:p>
+          <a:p>
+            <a:pPr marL="800100" lvl="1" indent="-342900" algn="just">
+              <a:buAutoNum type="arabicPeriod"/>
+            </a:pPr>
+            <a:r>
+              <a:rPr lang="en-US" sz="1600" b="1" dirty="0" smtClean="0">
+                <a:solidFill>
+                  <a:srgbClr val="002060"/>
+                </a:solidFill>
+              </a:rPr>
+              <a:t>Completely custom loading</a:t>
+            </a:r>
+          </a:p>
+          <a:p>
+            <a:pPr marL="1257300" lvl="2" indent="-342900" algn="just">
+              <a:buAutoNum type="arabicPeriod"/>
+            </a:pPr>
+            <a:r>
+              <a:rPr lang="en-US" sz="1400" b="1" dirty="0" smtClean="0">
+                <a:solidFill>
+                  <a:srgbClr val="002060"/>
+                </a:solidFill>
+              </a:rPr>
+              <a:t>Draw lines over it and save the coordinates</a:t>
+            </a:r>
+          </a:p>
+          <a:p>
+            <a:pPr marL="1257300" lvl="2" indent="-342900" algn="just">
+              <a:buAutoNum type="arabicPeriod"/>
+            </a:pPr>
+            <a:r>
+              <a:rPr lang="en-US" sz="1400" b="1" dirty="0" smtClean="0">
+                <a:solidFill>
+                  <a:srgbClr val="002060"/>
+                </a:solidFill>
+              </a:rPr>
+              <a:t>Using “generate” keyword, create movie with blackening out the picture.</a:t>
+            </a:r>
+          </a:p>
+          <a:p>
+            <a:pPr marL="800100" lvl="1" indent="-342900" algn="just">
+              <a:buAutoNum type="arabicPeriod"/>
+            </a:pPr>
+            <a:r>
+              <a:rPr lang="en-US" sz="1400" b="1" dirty="0" err="1" smtClean="0">
+                <a:solidFill>
+                  <a:srgbClr val="002060"/>
+                </a:solidFill>
+              </a:rPr>
+              <a:t>Balloning</a:t>
+            </a:r>
+            <a:r>
+              <a:rPr lang="en-US" sz="1400" b="1" dirty="0" smtClean="0">
+                <a:solidFill>
+                  <a:srgbClr val="002060"/>
+                </a:solidFill>
+              </a:rPr>
+              <a:t>: Gradually increase the size of a black circle</a:t>
+            </a:r>
+          </a:p>
+          <a:p>
+            <a:pPr marL="800100" lvl="1" indent="-342900" algn="just">
+              <a:buAutoNum type="arabicPeriod"/>
+            </a:pPr>
+            <a:r>
+              <a:rPr lang="en-US" sz="1400" b="1" dirty="0" smtClean="0">
+                <a:solidFill>
+                  <a:srgbClr val="002060"/>
+                </a:solidFill>
+              </a:rPr>
+              <a:t>Curtain: Let a big black square come from above (or below) </a:t>
+            </a:r>
+          </a:p>
+          <a:p>
+            <a:pPr marL="800100" lvl="1" indent="-342900" algn="just">
+              <a:buAutoNum type="arabicPeriod"/>
+            </a:pPr>
+            <a:r>
+              <a:rPr lang="en-US" sz="1400" b="1" dirty="0" smtClean="0">
+                <a:solidFill>
+                  <a:srgbClr val="002060"/>
+                </a:solidFill>
+              </a:rPr>
+              <a:t>… Any other manner of your choice</a:t>
+            </a:r>
+          </a:p>
+          <a:p>
+            <a:pPr marL="342900" indent="-342900" algn="just">
+              <a:buAutoNum type="arabicPeriod"/>
+            </a:pPr>
+            <a:r>
+              <a:rPr lang="en-US" sz="1600" b="1" dirty="0" smtClean="0">
+                <a:solidFill>
+                  <a:srgbClr val="002060"/>
+                </a:solidFill>
+              </a:rPr>
+              <a:t>Use this function to create loading of movie type of effect</a:t>
+            </a:r>
+          </a:p>
+          <a:p>
+            <a:pPr marL="342900" indent="-342900" algn="just">
+              <a:buAutoNum type="arabicPeriod"/>
+            </a:pPr>
+            <a:r>
+              <a:rPr lang="en-US" sz="1600" b="1" dirty="0" smtClean="0">
+                <a:solidFill>
+                  <a:srgbClr val="002060"/>
+                </a:solidFill>
+              </a:rPr>
+              <a:t>Convert this to model and use it accordingly</a:t>
+            </a:r>
           </a:p>
         </p:txBody>
       </p:sp>

</xml_diff>